<commit_message>
updating random train/test split and a few images
</commit_message>
<xml_diff>
--- a/Thesis/U-NetDiagram.pptx
+++ b/Thesis/U-NetDiagram.pptx
@@ -6,6 +6,7 @@
   </p:sldMasterIdLst>
   <p:sldIdLst>
     <p:sldId id="256" r:id="rId2"/>
+    <p:sldId id="257" r:id="rId3"/>
   </p:sldIdLst>
   <p:sldSz cx="12192000" cy="6858000"/>
   <p:notesSz cx="6858000" cy="9144000"/>
@@ -259,7 +260,7 @@
           <a:p>
             <a:fld id="{D57B9C68-1D75-FD45-8BAC-B9DE3823D683}" type="datetimeFigureOut">
               <a:rPr lang="en-US" smtClean="0"/>
-              <a:t>3/27/25</a:t>
+              <a:t>3/28/25</a:t>
             </a:fld>
             <a:endParaRPr lang="en-US"/>
           </a:p>
@@ -457,7 +458,7 @@
           <a:p>
             <a:fld id="{D57B9C68-1D75-FD45-8BAC-B9DE3823D683}" type="datetimeFigureOut">
               <a:rPr lang="en-US" smtClean="0"/>
-              <a:t>3/27/25</a:t>
+              <a:t>3/28/25</a:t>
             </a:fld>
             <a:endParaRPr lang="en-US"/>
           </a:p>
@@ -665,7 +666,7 @@
           <a:p>
             <a:fld id="{D57B9C68-1D75-FD45-8BAC-B9DE3823D683}" type="datetimeFigureOut">
               <a:rPr lang="en-US" smtClean="0"/>
-              <a:t>3/27/25</a:t>
+              <a:t>3/28/25</a:t>
             </a:fld>
             <a:endParaRPr lang="en-US"/>
           </a:p>
@@ -863,7 +864,7 @@
           <a:p>
             <a:fld id="{D57B9C68-1D75-FD45-8BAC-B9DE3823D683}" type="datetimeFigureOut">
               <a:rPr lang="en-US" smtClean="0"/>
-              <a:t>3/27/25</a:t>
+              <a:t>3/28/25</a:t>
             </a:fld>
             <a:endParaRPr lang="en-US"/>
           </a:p>
@@ -1138,7 +1139,7 @@
           <a:p>
             <a:fld id="{D57B9C68-1D75-FD45-8BAC-B9DE3823D683}" type="datetimeFigureOut">
               <a:rPr lang="en-US" smtClean="0"/>
-              <a:t>3/27/25</a:t>
+              <a:t>3/28/25</a:t>
             </a:fld>
             <a:endParaRPr lang="en-US"/>
           </a:p>
@@ -1403,7 +1404,7 @@
           <a:p>
             <a:fld id="{D57B9C68-1D75-FD45-8BAC-B9DE3823D683}" type="datetimeFigureOut">
               <a:rPr lang="en-US" smtClean="0"/>
-              <a:t>3/27/25</a:t>
+              <a:t>3/28/25</a:t>
             </a:fld>
             <a:endParaRPr lang="en-US"/>
           </a:p>
@@ -1815,7 +1816,7 @@
           <a:p>
             <a:fld id="{D57B9C68-1D75-FD45-8BAC-B9DE3823D683}" type="datetimeFigureOut">
               <a:rPr lang="en-US" smtClean="0"/>
-              <a:t>3/27/25</a:t>
+              <a:t>3/28/25</a:t>
             </a:fld>
             <a:endParaRPr lang="en-US"/>
           </a:p>
@@ -1956,7 +1957,7 @@
           <a:p>
             <a:fld id="{D57B9C68-1D75-FD45-8BAC-B9DE3823D683}" type="datetimeFigureOut">
               <a:rPr lang="en-US" smtClean="0"/>
-              <a:t>3/27/25</a:t>
+              <a:t>3/28/25</a:t>
             </a:fld>
             <a:endParaRPr lang="en-US"/>
           </a:p>
@@ -2069,7 +2070,7 @@
           <a:p>
             <a:fld id="{D57B9C68-1D75-FD45-8BAC-B9DE3823D683}" type="datetimeFigureOut">
               <a:rPr lang="en-US" smtClean="0"/>
-              <a:t>3/27/25</a:t>
+              <a:t>3/28/25</a:t>
             </a:fld>
             <a:endParaRPr lang="en-US"/>
           </a:p>
@@ -2380,7 +2381,7 @@
           <a:p>
             <a:fld id="{D57B9C68-1D75-FD45-8BAC-B9DE3823D683}" type="datetimeFigureOut">
               <a:rPr lang="en-US" smtClean="0"/>
-              <a:t>3/27/25</a:t>
+              <a:t>3/28/25</a:t>
             </a:fld>
             <a:endParaRPr lang="en-US"/>
           </a:p>
@@ -2668,7 +2669,7 @@
           <a:p>
             <a:fld id="{D57B9C68-1D75-FD45-8BAC-B9DE3823D683}" type="datetimeFigureOut">
               <a:rPr lang="en-US" smtClean="0"/>
-              <a:t>3/27/25</a:t>
+              <a:t>3/28/25</a:t>
             </a:fld>
             <a:endParaRPr lang="en-US"/>
           </a:p>
@@ -2909,7 +2910,7 @@
           <a:p>
             <a:fld id="{D57B9C68-1D75-FD45-8BAC-B9DE3823D683}" type="datetimeFigureOut">
               <a:rPr lang="en-US" smtClean="0"/>
-              <a:t>3/27/25</a:t>
+              <a:t>3/28/25</a:t>
             </a:fld>
             <a:endParaRPr lang="en-US"/>
           </a:p>
@@ -3627,7 +3628,7 @@
         </p:nvGrpSpPr>
         <p:grpSpPr>
           <a:xfrm>
-            <a:off x="311238" y="340326"/>
+            <a:off x="257314" y="548051"/>
             <a:ext cx="11459600" cy="6214606"/>
             <a:chOff x="311238" y="340326"/>
             <a:chExt cx="11459600" cy="6214606"/>
@@ -7943,6 +7944,2346 @@
 </p:sld>
 </file>
 
+<file path=ppt/slides/slide2.xml><?xml version="1.0" encoding="utf-8"?>
+<p:sld xmlns:a="http://schemas.openxmlformats.org/drawingml/2006/main" xmlns:r="http://schemas.openxmlformats.org/officeDocument/2006/relationships" xmlns:p="http://schemas.openxmlformats.org/presentationml/2006/main">
+  <p:cSld>
+    <p:spTree>
+      <p:nvGrpSpPr>
+        <p:cNvPr id="1" name=""/>
+        <p:cNvGrpSpPr/>
+        <p:nvPr/>
+      </p:nvGrpSpPr>
+      <p:grpSpPr>
+        <a:xfrm>
+          <a:off x="0" y="0"/>
+          <a:ext cx="0" cy="0"/>
+          <a:chOff x="0" y="0"/>
+          <a:chExt cx="0" cy="0"/>
+        </a:xfrm>
+      </p:grpSpPr>
+      <p:sp>
+        <p:nvSpPr>
+          <p:cNvPr id="2" name="16-Point Star 1">
+            <a:extLst>
+              <a:ext uri="{FF2B5EF4-FFF2-40B4-BE49-F238E27FC236}">
+                <a16:creationId xmlns:a16="http://schemas.microsoft.com/office/drawing/2014/main" id="{379F5CEB-8E71-5A92-B6F8-8012965C45B7}"/>
+              </a:ext>
+            </a:extLst>
+          </p:cNvPr>
+          <p:cNvSpPr/>
+          <p:nvPr/>
+        </p:nvSpPr>
+        <p:spPr>
+          <a:xfrm>
+            <a:off x="1312865" y="114296"/>
+            <a:ext cx="1752600" cy="1752600"/>
+          </a:xfrm>
+          <a:prstGeom prst="star16">
+            <a:avLst/>
+          </a:prstGeom>
+        </p:spPr>
+        <p:style>
+          <a:lnRef idx="2">
+            <a:schemeClr val="accent4">
+              <a:shade val="15000"/>
+            </a:schemeClr>
+          </a:lnRef>
+          <a:fillRef idx="1">
+            <a:schemeClr val="accent4"/>
+          </a:fillRef>
+          <a:effectRef idx="0">
+            <a:schemeClr val="accent4"/>
+          </a:effectRef>
+          <a:fontRef idx="minor">
+            <a:schemeClr val="lt1"/>
+          </a:fontRef>
+        </p:style>
+        <p:txBody>
+          <a:bodyPr rtlCol="0" anchor="ctr"/>
+          <a:lstStyle/>
+          <a:p>
+            <a:pPr algn="ctr"/>
+            <a:r>
+              <a:rPr lang="en-US" sz="1200" dirty="0"/>
+              <a:t>CFD solver</a:t>
+            </a:r>
+          </a:p>
+        </p:txBody>
+      </p:sp>
+      <p:sp>
+        <p:nvSpPr>
+          <p:cNvPr id="3" name="16-Point Star 2">
+            <a:extLst>
+              <a:ext uri="{FF2B5EF4-FFF2-40B4-BE49-F238E27FC236}">
+                <a16:creationId xmlns:a16="http://schemas.microsoft.com/office/drawing/2014/main" id="{CABF2F7A-FD94-F445-5825-D47EA7723756}"/>
+              </a:ext>
+            </a:extLst>
+          </p:cNvPr>
+          <p:cNvSpPr/>
+          <p:nvPr/>
+        </p:nvSpPr>
+        <p:spPr>
+          <a:xfrm>
+            <a:off x="3800477" y="114296"/>
+            <a:ext cx="1752600" cy="1752600"/>
+          </a:xfrm>
+          <a:prstGeom prst="star16">
+            <a:avLst/>
+          </a:prstGeom>
+        </p:spPr>
+        <p:style>
+          <a:lnRef idx="2">
+            <a:schemeClr val="accent1">
+              <a:shade val="15000"/>
+            </a:schemeClr>
+          </a:lnRef>
+          <a:fillRef idx="1">
+            <a:schemeClr val="accent1"/>
+          </a:fillRef>
+          <a:effectRef idx="0">
+            <a:schemeClr val="accent1"/>
+          </a:effectRef>
+          <a:fontRef idx="minor">
+            <a:schemeClr val="lt1"/>
+          </a:fontRef>
+        </p:style>
+        <p:txBody>
+          <a:bodyPr rtlCol="0" anchor="ctr"/>
+          <a:lstStyle/>
+          <a:p>
+            <a:pPr algn="ctr"/>
+            <a:r>
+              <a:rPr lang="en-US" sz="1200" dirty="0"/>
+              <a:t>Mass-conserving solver</a:t>
+            </a:r>
+          </a:p>
+        </p:txBody>
+      </p:sp>
+      <p:grpSp>
+        <p:nvGrpSpPr>
+          <p:cNvPr id="6" name="Group 5">
+            <a:extLst>
+              <a:ext uri="{FF2B5EF4-FFF2-40B4-BE49-F238E27FC236}">
+                <a16:creationId xmlns:a16="http://schemas.microsoft.com/office/drawing/2014/main" id="{F814572F-E6EB-410B-75CE-812BADDEE497}"/>
+              </a:ext>
+            </a:extLst>
+          </p:cNvPr>
+          <p:cNvGrpSpPr/>
+          <p:nvPr/>
+        </p:nvGrpSpPr>
+        <p:grpSpPr>
+          <a:xfrm>
+            <a:off x="3991453" y="2756690"/>
+            <a:ext cx="1263650" cy="1263650"/>
+            <a:chOff x="527050" y="4800600"/>
+            <a:chExt cx="1263650" cy="1263650"/>
+          </a:xfrm>
+          <a:pattFill prst="smGrid">
+            <a:fgClr>
+              <a:schemeClr val="accent1"/>
+            </a:fgClr>
+            <a:bgClr>
+              <a:schemeClr val="tx2">
+                <a:lumMod val="10000"/>
+                <a:lumOff val="90000"/>
+              </a:schemeClr>
+            </a:bgClr>
+          </a:pattFill>
+        </p:grpSpPr>
+        <p:sp>
+          <p:nvSpPr>
+            <p:cNvPr id="5" name="Rectangle 4">
+              <a:extLst>
+                <a:ext uri="{FF2B5EF4-FFF2-40B4-BE49-F238E27FC236}">
+                  <a16:creationId xmlns:a16="http://schemas.microsoft.com/office/drawing/2014/main" id="{4D4303B0-CA59-4383-8EFF-739C6D1D1D72}"/>
+                </a:ext>
+              </a:extLst>
+            </p:cNvPr>
+            <p:cNvSpPr/>
+            <p:nvPr/>
+          </p:nvSpPr>
+          <p:spPr>
+            <a:xfrm>
+              <a:off x="635000" y="4800600"/>
+              <a:ext cx="1155700" cy="1155700"/>
+            </a:xfrm>
+            <a:prstGeom prst="rect">
+              <a:avLst/>
+            </a:prstGeom>
+            <a:grpFill/>
+          </p:spPr>
+          <p:style>
+            <a:lnRef idx="2">
+              <a:schemeClr val="accent4">
+                <a:shade val="15000"/>
+              </a:schemeClr>
+            </a:lnRef>
+            <a:fillRef idx="1">
+              <a:schemeClr val="accent4"/>
+            </a:fillRef>
+            <a:effectRef idx="0">
+              <a:schemeClr val="accent4"/>
+            </a:effectRef>
+            <a:fontRef idx="minor">
+              <a:schemeClr val="lt1"/>
+            </a:fontRef>
+          </p:style>
+          <p:txBody>
+            <a:bodyPr rtlCol="0" anchor="ctr"/>
+            <a:lstStyle/>
+            <a:p>
+              <a:pPr algn="ctr"/>
+              <a:endParaRPr lang="en-US" dirty="0"/>
+            </a:p>
+          </p:txBody>
+        </p:sp>
+        <p:sp>
+          <p:nvSpPr>
+            <p:cNvPr id="4" name="Rectangle 3">
+              <a:extLst>
+                <a:ext uri="{FF2B5EF4-FFF2-40B4-BE49-F238E27FC236}">
+                  <a16:creationId xmlns:a16="http://schemas.microsoft.com/office/drawing/2014/main" id="{3F2EE83B-462C-4600-CB8D-AD0D86131609}"/>
+                </a:ext>
+              </a:extLst>
+            </p:cNvPr>
+            <p:cNvSpPr/>
+            <p:nvPr/>
+          </p:nvSpPr>
+          <p:spPr>
+            <a:xfrm>
+              <a:off x="527050" y="4908550"/>
+              <a:ext cx="1155700" cy="1155700"/>
+            </a:xfrm>
+            <a:prstGeom prst="rect">
+              <a:avLst/>
+            </a:prstGeom>
+            <a:grpFill/>
+          </p:spPr>
+          <p:style>
+            <a:lnRef idx="2">
+              <a:schemeClr val="accent4">
+                <a:shade val="15000"/>
+              </a:schemeClr>
+            </a:lnRef>
+            <a:fillRef idx="1">
+              <a:schemeClr val="accent4"/>
+            </a:fillRef>
+            <a:effectRef idx="0">
+              <a:schemeClr val="accent4"/>
+            </a:effectRef>
+            <a:fontRef idx="minor">
+              <a:schemeClr val="lt1"/>
+            </a:fontRef>
+          </p:style>
+          <p:txBody>
+            <a:bodyPr rtlCol="0" anchor="ctr"/>
+            <a:lstStyle/>
+            <a:p>
+              <a:pPr algn="ctr"/>
+              <a:endParaRPr lang="en-US" dirty="0">
+                <a:highlight>
+                  <a:srgbClr val="000000"/>
+                </a:highlight>
+              </a:endParaRPr>
+            </a:p>
+          </p:txBody>
+        </p:sp>
+      </p:grpSp>
+      <p:grpSp>
+        <p:nvGrpSpPr>
+          <p:cNvPr id="7" name="Group 6">
+            <a:extLst>
+              <a:ext uri="{FF2B5EF4-FFF2-40B4-BE49-F238E27FC236}">
+                <a16:creationId xmlns:a16="http://schemas.microsoft.com/office/drawing/2014/main" id="{ED059059-789D-610D-53BA-15A40ADD763C}"/>
+              </a:ext>
+            </a:extLst>
+          </p:cNvPr>
+          <p:cNvGrpSpPr/>
+          <p:nvPr/>
+        </p:nvGrpSpPr>
+        <p:grpSpPr>
+          <a:xfrm>
+            <a:off x="1568452" y="2756690"/>
+            <a:ext cx="1263650" cy="1263650"/>
+            <a:chOff x="527050" y="4800600"/>
+            <a:chExt cx="1263650" cy="1263650"/>
+          </a:xfrm>
+          <a:pattFill prst="smGrid">
+            <a:fgClr>
+              <a:schemeClr val="accent1"/>
+            </a:fgClr>
+            <a:bgClr>
+              <a:schemeClr val="accent1">
+                <a:lumMod val="20000"/>
+                <a:lumOff val="80000"/>
+              </a:schemeClr>
+            </a:bgClr>
+          </a:pattFill>
+        </p:grpSpPr>
+        <p:sp>
+          <p:nvSpPr>
+            <p:cNvPr id="8" name="Rectangle 7">
+              <a:extLst>
+                <a:ext uri="{FF2B5EF4-FFF2-40B4-BE49-F238E27FC236}">
+                  <a16:creationId xmlns:a16="http://schemas.microsoft.com/office/drawing/2014/main" id="{971BA0AF-99F3-80A3-BCC5-C89E02F08960}"/>
+                </a:ext>
+              </a:extLst>
+            </p:cNvPr>
+            <p:cNvSpPr/>
+            <p:nvPr/>
+          </p:nvSpPr>
+          <p:spPr>
+            <a:xfrm>
+              <a:off x="635000" y="4800600"/>
+              <a:ext cx="1155700" cy="1155700"/>
+            </a:xfrm>
+            <a:prstGeom prst="rect">
+              <a:avLst/>
+            </a:prstGeom>
+            <a:grpFill/>
+          </p:spPr>
+          <p:style>
+            <a:lnRef idx="2">
+              <a:schemeClr val="accent4">
+                <a:shade val="15000"/>
+              </a:schemeClr>
+            </a:lnRef>
+            <a:fillRef idx="1">
+              <a:schemeClr val="accent4"/>
+            </a:fillRef>
+            <a:effectRef idx="0">
+              <a:schemeClr val="accent4"/>
+            </a:effectRef>
+            <a:fontRef idx="minor">
+              <a:schemeClr val="lt1"/>
+            </a:fontRef>
+          </p:style>
+          <p:txBody>
+            <a:bodyPr rtlCol="0" anchor="ctr"/>
+            <a:lstStyle/>
+            <a:p>
+              <a:pPr algn="ctr"/>
+              <a:endParaRPr lang="en-US" dirty="0"/>
+            </a:p>
+          </p:txBody>
+        </p:sp>
+        <p:sp>
+          <p:nvSpPr>
+            <p:cNvPr id="9" name="Rectangle 8">
+              <a:extLst>
+                <a:ext uri="{FF2B5EF4-FFF2-40B4-BE49-F238E27FC236}">
+                  <a16:creationId xmlns:a16="http://schemas.microsoft.com/office/drawing/2014/main" id="{4A07F261-A830-EAC3-A44F-D9C920173848}"/>
+                </a:ext>
+              </a:extLst>
+            </p:cNvPr>
+            <p:cNvSpPr/>
+            <p:nvPr/>
+          </p:nvSpPr>
+          <p:spPr>
+            <a:xfrm>
+              <a:off x="527050" y="4908550"/>
+              <a:ext cx="1155700" cy="1155700"/>
+            </a:xfrm>
+            <a:prstGeom prst="rect">
+              <a:avLst/>
+            </a:prstGeom>
+            <a:grpFill/>
+          </p:spPr>
+          <p:style>
+            <a:lnRef idx="2">
+              <a:schemeClr val="accent4">
+                <a:shade val="15000"/>
+              </a:schemeClr>
+            </a:lnRef>
+            <a:fillRef idx="1">
+              <a:schemeClr val="accent4"/>
+            </a:fillRef>
+            <a:effectRef idx="0">
+              <a:schemeClr val="accent4"/>
+            </a:effectRef>
+            <a:fontRef idx="minor">
+              <a:schemeClr val="lt1"/>
+            </a:fontRef>
+          </p:style>
+          <p:txBody>
+            <a:bodyPr rtlCol="0" anchor="ctr"/>
+            <a:lstStyle/>
+            <a:p>
+              <a:pPr algn="ctr"/>
+              <a:endParaRPr lang="en-US" dirty="0">
+                <a:highlight>
+                  <a:srgbClr val="000000"/>
+                </a:highlight>
+              </a:endParaRPr>
+            </a:p>
+          </p:txBody>
+        </p:sp>
+      </p:grpSp>
+      <p:grpSp>
+        <p:nvGrpSpPr>
+          <p:cNvPr id="10" name="Group 9">
+            <a:extLst>
+              <a:ext uri="{FF2B5EF4-FFF2-40B4-BE49-F238E27FC236}">
+                <a16:creationId xmlns:a16="http://schemas.microsoft.com/office/drawing/2014/main" id="{53CF25A4-6430-5AC1-EAB0-D07634844057}"/>
+              </a:ext>
+            </a:extLst>
+          </p:cNvPr>
+          <p:cNvGrpSpPr/>
+          <p:nvPr/>
+        </p:nvGrpSpPr>
+        <p:grpSpPr>
+          <a:xfrm>
+            <a:off x="3892550" y="4910135"/>
+            <a:ext cx="1263650" cy="1263650"/>
+            <a:chOff x="527050" y="4800600"/>
+            <a:chExt cx="1263650" cy="1263650"/>
+          </a:xfrm>
+          <a:pattFill prst="lgGrid">
+            <a:fgClr>
+              <a:schemeClr val="accent1"/>
+            </a:fgClr>
+            <a:bgClr>
+              <a:schemeClr val="tx2">
+                <a:lumMod val="10000"/>
+                <a:lumOff val="90000"/>
+              </a:schemeClr>
+            </a:bgClr>
+          </a:pattFill>
+        </p:grpSpPr>
+        <p:sp>
+          <p:nvSpPr>
+            <p:cNvPr id="11" name="Rectangle 10">
+              <a:extLst>
+                <a:ext uri="{FF2B5EF4-FFF2-40B4-BE49-F238E27FC236}">
+                  <a16:creationId xmlns:a16="http://schemas.microsoft.com/office/drawing/2014/main" id="{A51C04EE-73B6-0788-B9C2-B60D6F2C8A83}"/>
+                </a:ext>
+              </a:extLst>
+            </p:cNvPr>
+            <p:cNvSpPr/>
+            <p:nvPr/>
+          </p:nvSpPr>
+          <p:spPr>
+            <a:xfrm>
+              <a:off x="635000" y="4800600"/>
+              <a:ext cx="1155700" cy="1155700"/>
+            </a:xfrm>
+            <a:prstGeom prst="rect">
+              <a:avLst/>
+            </a:prstGeom>
+            <a:grpFill/>
+          </p:spPr>
+          <p:style>
+            <a:lnRef idx="2">
+              <a:schemeClr val="accent4">
+                <a:shade val="15000"/>
+              </a:schemeClr>
+            </a:lnRef>
+            <a:fillRef idx="1">
+              <a:schemeClr val="accent4"/>
+            </a:fillRef>
+            <a:effectRef idx="0">
+              <a:schemeClr val="accent4"/>
+            </a:effectRef>
+            <a:fontRef idx="minor">
+              <a:schemeClr val="lt1"/>
+            </a:fontRef>
+          </p:style>
+          <p:txBody>
+            <a:bodyPr rtlCol="0" anchor="ctr"/>
+            <a:lstStyle/>
+            <a:p>
+              <a:pPr algn="ctr"/>
+              <a:endParaRPr lang="en-US" dirty="0"/>
+            </a:p>
+          </p:txBody>
+        </p:sp>
+        <p:sp>
+          <p:nvSpPr>
+            <p:cNvPr id="12" name="Rectangle 11">
+              <a:extLst>
+                <a:ext uri="{FF2B5EF4-FFF2-40B4-BE49-F238E27FC236}">
+                  <a16:creationId xmlns:a16="http://schemas.microsoft.com/office/drawing/2014/main" id="{90422ED6-CE5C-1D3B-398B-BEB6F5D6BD3D}"/>
+                </a:ext>
+              </a:extLst>
+            </p:cNvPr>
+            <p:cNvSpPr/>
+            <p:nvPr/>
+          </p:nvSpPr>
+          <p:spPr>
+            <a:xfrm>
+              <a:off x="527050" y="4908550"/>
+              <a:ext cx="1155700" cy="1155700"/>
+            </a:xfrm>
+            <a:prstGeom prst="rect">
+              <a:avLst/>
+            </a:prstGeom>
+            <a:grpFill/>
+          </p:spPr>
+          <p:style>
+            <a:lnRef idx="2">
+              <a:schemeClr val="accent4">
+                <a:shade val="15000"/>
+              </a:schemeClr>
+            </a:lnRef>
+            <a:fillRef idx="1">
+              <a:schemeClr val="accent4"/>
+            </a:fillRef>
+            <a:effectRef idx="0">
+              <a:schemeClr val="accent4"/>
+            </a:effectRef>
+            <a:fontRef idx="minor">
+              <a:schemeClr val="lt1"/>
+            </a:fontRef>
+          </p:style>
+          <p:txBody>
+            <a:bodyPr rtlCol="0" anchor="ctr"/>
+            <a:lstStyle/>
+            <a:p>
+              <a:pPr algn="ctr"/>
+              <a:endParaRPr lang="en-US" dirty="0">
+                <a:highlight>
+                  <a:srgbClr val="000000"/>
+                </a:highlight>
+              </a:endParaRPr>
+            </a:p>
+          </p:txBody>
+        </p:sp>
+      </p:grpSp>
+      <p:grpSp>
+        <p:nvGrpSpPr>
+          <p:cNvPr id="13" name="Group 12">
+            <a:extLst>
+              <a:ext uri="{FF2B5EF4-FFF2-40B4-BE49-F238E27FC236}">
+                <a16:creationId xmlns:a16="http://schemas.microsoft.com/office/drawing/2014/main" id="{B8DABFC6-D138-9A95-FB6C-06C98F66268A}"/>
+              </a:ext>
+            </a:extLst>
+          </p:cNvPr>
+          <p:cNvGrpSpPr/>
+          <p:nvPr/>
+        </p:nvGrpSpPr>
+        <p:grpSpPr>
+          <a:xfrm>
+            <a:off x="1514477" y="4910135"/>
+            <a:ext cx="1263650" cy="1263650"/>
+            <a:chOff x="527050" y="4800600"/>
+            <a:chExt cx="1263650" cy="1263650"/>
+          </a:xfrm>
+          <a:pattFill prst="lgGrid">
+            <a:fgClr>
+              <a:schemeClr val="accent1"/>
+            </a:fgClr>
+            <a:bgClr>
+              <a:schemeClr val="accent1">
+                <a:lumMod val="20000"/>
+                <a:lumOff val="80000"/>
+              </a:schemeClr>
+            </a:bgClr>
+          </a:pattFill>
+        </p:grpSpPr>
+        <p:sp>
+          <p:nvSpPr>
+            <p:cNvPr id="14" name="Rectangle 13">
+              <a:extLst>
+                <a:ext uri="{FF2B5EF4-FFF2-40B4-BE49-F238E27FC236}">
+                  <a16:creationId xmlns:a16="http://schemas.microsoft.com/office/drawing/2014/main" id="{D5C9DD55-412E-B4C1-19FC-CD3FF928B7A0}"/>
+                </a:ext>
+              </a:extLst>
+            </p:cNvPr>
+            <p:cNvSpPr/>
+            <p:nvPr/>
+          </p:nvSpPr>
+          <p:spPr>
+            <a:xfrm>
+              <a:off x="635000" y="4800600"/>
+              <a:ext cx="1155700" cy="1155700"/>
+            </a:xfrm>
+            <a:prstGeom prst="rect">
+              <a:avLst/>
+            </a:prstGeom>
+            <a:grpFill/>
+          </p:spPr>
+          <p:style>
+            <a:lnRef idx="2">
+              <a:schemeClr val="accent4">
+                <a:shade val="15000"/>
+              </a:schemeClr>
+            </a:lnRef>
+            <a:fillRef idx="1">
+              <a:schemeClr val="accent4"/>
+            </a:fillRef>
+            <a:effectRef idx="0">
+              <a:schemeClr val="accent4"/>
+            </a:effectRef>
+            <a:fontRef idx="minor">
+              <a:schemeClr val="lt1"/>
+            </a:fontRef>
+          </p:style>
+          <p:txBody>
+            <a:bodyPr rtlCol="0" anchor="ctr"/>
+            <a:lstStyle/>
+            <a:p>
+              <a:pPr algn="ctr"/>
+              <a:endParaRPr lang="en-US" dirty="0"/>
+            </a:p>
+          </p:txBody>
+        </p:sp>
+        <p:sp>
+          <p:nvSpPr>
+            <p:cNvPr id="15" name="Rectangle 14">
+              <a:extLst>
+                <a:ext uri="{FF2B5EF4-FFF2-40B4-BE49-F238E27FC236}">
+                  <a16:creationId xmlns:a16="http://schemas.microsoft.com/office/drawing/2014/main" id="{6359D41F-A068-7FCD-D5B8-8308279BF71D}"/>
+                </a:ext>
+              </a:extLst>
+            </p:cNvPr>
+            <p:cNvSpPr/>
+            <p:nvPr/>
+          </p:nvSpPr>
+          <p:spPr>
+            <a:xfrm>
+              <a:off x="527050" y="4908550"/>
+              <a:ext cx="1155700" cy="1155700"/>
+            </a:xfrm>
+            <a:prstGeom prst="rect">
+              <a:avLst/>
+            </a:prstGeom>
+            <a:grpFill/>
+          </p:spPr>
+          <p:style>
+            <a:lnRef idx="2">
+              <a:schemeClr val="accent4">
+                <a:shade val="15000"/>
+              </a:schemeClr>
+            </a:lnRef>
+            <a:fillRef idx="1">
+              <a:schemeClr val="accent4"/>
+            </a:fillRef>
+            <a:effectRef idx="0">
+              <a:schemeClr val="accent4"/>
+            </a:effectRef>
+            <a:fontRef idx="minor">
+              <a:schemeClr val="lt1"/>
+            </a:fontRef>
+          </p:style>
+          <p:txBody>
+            <a:bodyPr rtlCol="0" anchor="ctr"/>
+            <a:lstStyle/>
+            <a:p>
+              <a:pPr algn="ctr"/>
+              <a:endParaRPr lang="en-US" dirty="0">
+                <a:highlight>
+                  <a:srgbClr val="000000"/>
+                </a:highlight>
+              </a:endParaRPr>
+            </a:p>
+          </p:txBody>
+        </p:sp>
+      </p:grpSp>
+      <p:sp>
+        <p:nvSpPr>
+          <p:cNvPr id="17" name="Rectangle 16">
+            <a:extLst>
+              <a:ext uri="{FF2B5EF4-FFF2-40B4-BE49-F238E27FC236}">
+                <a16:creationId xmlns:a16="http://schemas.microsoft.com/office/drawing/2014/main" id="{4DF5262F-6A5E-E9B1-8138-A00F34DC6FBE}"/>
+              </a:ext>
+            </a:extLst>
+          </p:cNvPr>
+          <p:cNvSpPr/>
+          <p:nvPr/>
+        </p:nvSpPr>
+        <p:spPr>
+          <a:xfrm>
+            <a:off x="2996408" y="5376067"/>
+            <a:ext cx="534987" cy="223836"/>
+          </a:xfrm>
+          <a:prstGeom prst="rect">
+            <a:avLst/>
+          </a:prstGeom>
+          <a:solidFill>
+            <a:schemeClr val="bg2">
+              <a:lumMod val="50000"/>
+            </a:schemeClr>
+          </a:solidFill>
+          <a:ln>
+            <a:noFill/>
+          </a:ln>
+        </p:spPr>
+        <p:style>
+          <a:lnRef idx="2">
+            <a:schemeClr val="accent1">
+              <a:shade val="15000"/>
+            </a:schemeClr>
+          </a:lnRef>
+          <a:fillRef idx="1">
+            <a:schemeClr val="accent1"/>
+          </a:fillRef>
+          <a:effectRef idx="0">
+            <a:schemeClr val="accent1"/>
+          </a:effectRef>
+          <a:fontRef idx="minor">
+            <a:schemeClr val="lt1"/>
+          </a:fontRef>
+        </p:style>
+        <p:txBody>
+          <a:bodyPr rtlCol="0" anchor="ctr"/>
+          <a:lstStyle/>
+          <a:p>
+            <a:pPr algn="ctr"/>
+            <a:endParaRPr lang="en-US"/>
+          </a:p>
+        </p:txBody>
+      </p:sp>
+      <p:grpSp>
+        <p:nvGrpSpPr>
+          <p:cNvPr id="19" name="Group 18">
+            <a:extLst>
+              <a:ext uri="{FF2B5EF4-FFF2-40B4-BE49-F238E27FC236}">
+                <a16:creationId xmlns:a16="http://schemas.microsoft.com/office/drawing/2014/main" id="{082A627B-A5E6-F14E-749B-F4DEB221298D}"/>
+              </a:ext>
+            </a:extLst>
+          </p:cNvPr>
+          <p:cNvGrpSpPr/>
+          <p:nvPr/>
+        </p:nvGrpSpPr>
+        <p:grpSpPr>
+          <a:xfrm>
+            <a:off x="6703221" y="4841872"/>
+            <a:ext cx="1263650" cy="1263650"/>
+            <a:chOff x="527050" y="4800600"/>
+            <a:chExt cx="1263650" cy="1263650"/>
+          </a:xfrm>
+          <a:pattFill prst="lgGrid">
+            <a:fgClr>
+              <a:schemeClr val="accent1"/>
+            </a:fgClr>
+            <a:bgClr>
+              <a:srgbClr val="F6A39A"/>
+            </a:bgClr>
+          </a:pattFill>
+        </p:grpSpPr>
+        <p:sp>
+          <p:nvSpPr>
+            <p:cNvPr id="20" name="Rectangle 19">
+              <a:extLst>
+                <a:ext uri="{FF2B5EF4-FFF2-40B4-BE49-F238E27FC236}">
+                  <a16:creationId xmlns:a16="http://schemas.microsoft.com/office/drawing/2014/main" id="{190B859E-D781-8F02-1F1E-7A56E99BE8D6}"/>
+                </a:ext>
+              </a:extLst>
+            </p:cNvPr>
+            <p:cNvSpPr/>
+            <p:nvPr/>
+          </p:nvSpPr>
+          <p:spPr>
+            <a:xfrm>
+              <a:off x="635000" y="4800600"/>
+              <a:ext cx="1155700" cy="1155700"/>
+            </a:xfrm>
+            <a:prstGeom prst="rect">
+              <a:avLst/>
+            </a:prstGeom>
+            <a:grpFill/>
+          </p:spPr>
+          <p:style>
+            <a:lnRef idx="2">
+              <a:schemeClr val="accent4">
+                <a:shade val="15000"/>
+              </a:schemeClr>
+            </a:lnRef>
+            <a:fillRef idx="1">
+              <a:schemeClr val="accent4"/>
+            </a:fillRef>
+            <a:effectRef idx="0">
+              <a:schemeClr val="accent4"/>
+            </a:effectRef>
+            <a:fontRef idx="minor">
+              <a:schemeClr val="lt1"/>
+            </a:fontRef>
+          </p:style>
+          <p:txBody>
+            <a:bodyPr rtlCol="0" anchor="ctr"/>
+            <a:lstStyle/>
+            <a:p>
+              <a:pPr algn="ctr"/>
+              <a:endParaRPr lang="en-US" dirty="0"/>
+            </a:p>
+          </p:txBody>
+        </p:sp>
+        <p:sp>
+          <p:nvSpPr>
+            <p:cNvPr id="21" name="Rectangle 20">
+              <a:extLst>
+                <a:ext uri="{FF2B5EF4-FFF2-40B4-BE49-F238E27FC236}">
+                  <a16:creationId xmlns:a16="http://schemas.microsoft.com/office/drawing/2014/main" id="{C09A26D5-A7C2-9999-8F9B-2A02A9DF26B3}"/>
+                </a:ext>
+              </a:extLst>
+            </p:cNvPr>
+            <p:cNvSpPr/>
+            <p:nvPr/>
+          </p:nvSpPr>
+          <p:spPr>
+            <a:xfrm>
+              <a:off x="527050" y="4908550"/>
+              <a:ext cx="1155700" cy="1155700"/>
+            </a:xfrm>
+            <a:prstGeom prst="rect">
+              <a:avLst/>
+            </a:prstGeom>
+            <a:grpFill/>
+          </p:spPr>
+          <p:style>
+            <a:lnRef idx="2">
+              <a:schemeClr val="accent4">
+                <a:shade val="15000"/>
+              </a:schemeClr>
+            </a:lnRef>
+            <a:fillRef idx="1">
+              <a:schemeClr val="accent4"/>
+            </a:fillRef>
+            <a:effectRef idx="0">
+              <a:schemeClr val="accent4"/>
+            </a:effectRef>
+            <a:fontRef idx="minor">
+              <a:schemeClr val="lt1"/>
+            </a:fontRef>
+          </p:style>
+          <p:txBody>
+            <a:bodyPr rtlCol="0" anchor="ctr"/>
+            <a:lstStyle/>
+            <a:p>
+              <a:pPr algn="ctr"/>
+              <a:endParaRPr lang="en-US" dirty="0">
+                <a:highlight>
+                  <a:srgbClr val="000000"/>
+                </a:highlight>
+              </a:endParaRPr>
+            </a:p>
+          </p:txBody>
+        </p:sp>
+      </p:grpSp>
+      <p:sp>
+        <p:nvSpPr>
+          <p:cNvPr id="22" name="Oval 21">
+            <a:extLst>
+              <a:ext uri="{FF2B5EF4-FFF2-40B4-BE49-F238E27FC236}">
+                <a16:creationId xmlns:a16="http://schemas.microsoft.com/office/drawing/2014/main" id="{F4931CEA-F186-B23B-47CD-3FBFD674A979}"/>
+              </a:ext>
+            </a:extLst>
+          </p:cNvPr>
+          <p:cNvSpPr/>
+          <p:nvPr/>
+        </p:nvSpPr>
+        <p:spPr>
+          <a:xfrm>
+            <a:off x="9069065" y="3428202"/>
+            <a:ext cx="1871662" cy="1871662"/>
+          </a:xfrm>
+          <a:prstGeom prst="ellipse">
+            <a:avLst/>
+          </a:prstGeom>
+          <a:solidFill>
+            <a:schemeClr val="accent5">
+              <a:lumMod val="75000"/>
+            </a:schemeClr>
+          </a:solidFill>
+          <a:ln>
+            <a:noFill/>
+          </a:ln>
+        </p:spPr>
+        <p:style>
+          <a:lnRef idx="2">
+            <a:schemeClr val="accent1">
+              <a:shade val="15000"/>
+            </a:schemeClr>
+          </a:lnRef>
+          <a:fillRef idx="1">
+            <a:schemeClr val="accent1"/>
+          </a:fillRef>
+          <a:effectRef idx="0">
+            <a:schemeClr val="accent1"/>
+          </a:effectRef>
+          <a:fontRef idx="minor">
+            <a:schemeClr val="lt1"/>
+          </a:fontRef>
+        </p:style>
+        <p:txBody>
+          <a:bodyPr rtlCol="0" anchor="ctr"/>
+          <a:lstStyle/>
+          <a:p>
+            <a:pPr algn="ctr"/>
+            <a:r>
+              <a:rPr lang="en-US" dirty="0"/>
+              <a:t>Neural Network</a:t>
+            </a:r>
+          </a:p>
+        </p:txBody>
+      </p:sp>
+      <p:sp>
+        <p:nvSpPr>
+          <p:cNvPr id="24" name="Rectangle 23">
+            <a:extLst>
+              <a:ext uri="{FF2B5EF4-FFF2-40B4-BE49-F238E27FC236}">
+                <a16:creationId xmlns:a16="http://schemas.microsoft.com/office/drawing/2014/main" id="{18FAABBA-611D-00EC-FFFB-A824C665B12B}"/>
+              </a:ext>
+            </a:extLst>
+          </p:cNvPr>
+          <p:cNvSpPr/>
+          <p:nvPr/>
+        </p:nvSpPr>
+        <p:spPr>
+          <a:xfrm>
+            <a:off x="6936583" y="237985"/>
+            <a:ext cx="1155700" cy="1155700"/>
+          </a:xfrm>
+          <a:prstGeom prst="rect">
+            <a:avLst/>
+          </a:prstGeom>
+          <a:pattFill prst="smGrid">
+            <a:fgClr>
+              <a:schemeClr val="accent1"/>
+            </a:fgClr>
+            <a:bgClr>
+              <a:schemeClr val="accent6">
+                <a:lumMod val="60000"/>
+                <a:lumOff val="40000"/>
+              </a:schemeClr>
+            </a:bgClr>
+          </a:pattFill>
+        </p:spPr>
+        <p:style>
+          <a:lnRef idx="2">
+            <a:schemeClr val="accent4">
+              <a:shade val="15000"/>
+            </a:schemeClr>
+          </a:lnRef>
+          <a:fillRef idx="1">
+            <a:schemeClr val="accent4"/>
+          </a:fillRef>
+          <a:effectRef idx="0">
+            <a:schemeClr val="accent4"/>
+          </a:effectRef>
+          <a:fontRef idx="minor">
+            <a:schemeClr val="lt1"/>
+          </a:fontRef>
+        </p:style>
+        <p:txBody>
+          <a:bodyPr rtlCol="0" anchor="ctr"/>
+          <a:lstStyle/>
+          <a:p>
+            <a:pPr algn="ctr"/>
+            <a:endParaRPr lang="en-US" dirty="0"/>
+          </a:p>
+        </p:txBody>
+      </p:sp>
+      <p:sp>
+        <p:nvSpPr>
+          <p:cNvPr id="27" name="Rectangle 26">
+            <a:extLst>
+              <a:ext uri="{FF2B5EF4-FFF2-40B4-BE49-F238E27FC236}">
+                <a16:creationId xmlns:a16="http://schemas.microsoft.com/office/drawing/2014/main" id="{DB43B7EA-A955-BA45-4290-7E0E82DF6F80}"/>
+              </a:ext>
+            </a:extLst>
+          </p:cNvPr>
+          <p:cNvSpPr/>
+          <p:nvPr/>
+        </p:nvSpPr>
+        <p:spPr>
+          <a:xfrm>
+            <a:off x="9545639" y="197766"/>
+            <a:ext cx="1155700" cy="1155700"/>
+          </a:xfrm>
+          <a:prstGeom prst="rect">
+            <a:avLst/>
+          </a:prstGeom>
+          <a:pattFill prst="lgGrid">
+            <a:fgClr>
+              <a:schemeClr val="accent1"/>
+            </a:fgClr>
+            <a:bgClr>
+              <a:schemeClr val="accent6">
+                <a:lumMod val="60000"/>
+                <a:lumOff val="40000"/>
+              </a:schemeClr>
+            </a:bgClr>
+          </a:pattFill>
+        </p:spPr>
+        <p:style>
+          <a:lnRef idx="2">
+            <a:schemeClr val="accent4">
+              <a:shade val="15000"/>
+            </a:schemeClr>
+          </a:lnRef>
+          <a:fillRef idx="1">
+            <a:schemeClr val="accent4"/>
+          </a:fillRef>
+          <a:effectRef idx="0">
+            <a:schemeClr val="accent4"/>
+          </a:effectRef>
+          <a:fontRef idx="minor">
+            <a:schemeClr val="lt1"/>
+          </a:fontRef>
+        </p:style>
+        <p:txBody>
+          <a:bodyPr rtlCol="0" anchor="ctr"/>
+          <a:lstStyle/>
+          <a:p>
+            <a:pPr algn="ctr"/>
+            <a:endParaRPr lang="en-US" dirty="0"/>
+          </a:p>
+        </p:txBody>
+      </p:sp>
+      <p:grpSp>
+        <p:nvGrpSpPr>
+          <p:cNvPr id="33" name="Group 32">
+            <a:extLst>
+              <a:ext uri="{FF2B5EF4-FFF2-40B4-BE49-F238E27FC236}">
+                <a16:creationId xmlns:a16="http://schemas.microsoft.com/office/drawing/2014/main" id="{C6B3A159-DB84-10E1-921C-B5CDCCCE9263}"/>
+              </a:ext>
+            </a:extLst>
+          </p:cNvPr>
+          <p:cNvGrpSpPr/>
+          <p:nvPr/>
+        </p:nvGrpSpPr>
+        <p:grpSpPr>
+          <a:xfrm>
+            <a:off x="6719228" y="2657877"/>
+            <a:ext cx="1371600" cy="1371600"/>
+            <a:chOff x="8326426" y="1241425"/>
+            <a:chExt cx="1371600" cy="1371600"/>
+          </a:xfrm>
+        </p:grpSpPr>
+        <p:sp>
+          <p:nvSpPr>
+            <p:cNvPr id="32" name="Rectangle 31">
+              <a:extLst>
+                <a:ext uri="{FF2B5EF4-FFF2-40B4-BE49-F238E27FC236}">
+                  <a16:creationId xmlns:a16="http://schemas.microsoft.com/office/drawing/2014/main" id="{876E748A-1D1D-B7FD-AE89-AD727A39A977}"/>
+                </a:ext>
+              </a:extLst>
+            </p:cNvPr>
+            <p:cNvSpPr/>
+            <p:nvPr/>
+          </p:nvSpPr>
+          <p:spPr>
+            <a:xfrm>
+              <a:off x="8542326" y="1241425"/>
+              <a:ext cx="1155700" cy="1155700"/>
+            </a:xfrm>
+            <a:prstGeom prst="rect">
+              <a:avLst/>
+            </a:prstGeom>
+            <a:pattFill prst="lgGrid">
+              <a:fgClr>
+                <a:schemeClr val="accent1"/>
+              </a:fgClr>
+              <a:bgClr>
+                <a:schemeClr val="accent6">
+                  <a:lumMod val="60000"/>
+                  <a:lumOff val="40000"/>
+                </a:schemeClr>
+              </a:bgClr>
+            </a:pattFill>
+          </p:spPr>
+          <p:style>
+            <a:lnRef idx="2">
+              <a:schemeClr val="accent4">
+                <a:shade val="15000"/>
+              </a:schemeClr>
+            </a:lnRef>
+            <a:fillRef idx="1">
+              <a:schemeClr val="accent4"/>
+            </a:fillRef>
+            <a:effectRef idx="0">
+              <a:schemeClr val="accent4"/>
+            </a:effectRef>
+            <a:fontRef idx="minor">
+              <a:schemeClr val="lt1"/>
+            </a:fontRef>
+          </p:style>
+          <p:txBody>
+            <a:bodyPr rtlCol="0" anchor="ctr"/>
+            <a:lstStyle/>
+            <a:p>
+              <a:pPr algn="ctr"/>
+              <a:endParaRPr lang="en-US" dirty="0"/>
+            </a:p>
+          </p:txBody>
+        </p:sp>
+        <p:grpSp>
+          <p:nvGrpSpPr>
+            <p:cNvPr id="29" name="Group 28">
+              <a:extLst>
+                <a:ext uri="{FF2B5EF4-FFF2-40B4-BE49-F238E27FC236}">
+                  <a16:creationId xmlns:a16="http://schemas.microsoft.com/office/drawing/2014/main" id="{D782571E-DF9D-B9BE-ED6C-A6C9A97E6AA3}"/>
+                </a:ext>
+              </a:extLst>
+            </p:cNvPr>
+            <p:cNvGrpSpPr/>
+            <p:nvPr/>
+          </p:nvGrpSpPr>
+          <p:grpSpPr>
+            <a:xfrm>
+              <a:off x="8326426" y="1349375"/>
+              <a:ext cx="1263650" cy="1263650"/>
+              <a:chOff x="527050" y="4800600"/>
+              <a:chExt cx="1263650" cy="1263650"/>
+            </a:xfrm>
+            <a:pattFill prst="lgGrid">
+              <a:fgClr>
+                <a:schemeClr val="accent1"/>
+              </a:fgClr>
+              <a:bgClr>
+                <a:schemeClr val="tx2">
+                  <a:lumMod val="10000"/>
+                  <a:lumOff val="90000"/>
+                </a:schemeClr>
+              </a:bgClr>
+            </a:pattFill>
+          </p:grpSpPr>
+          <p:sp>
+            <p:nvSpPr>
+              <p:cNvPr id="30" name="Rectangle 29">
+                <a:extLst>
+                  <a:ext uri="{FF2B5EF4-FFF2-40B4-BE49-F238E27FC236}">
+                    <a16:creationId xmlns:a16="http://schemas.microsoft.com/office/drawing/2014/main" id="{8729D292-48E2-3DC6-1B4C-1AA325426EB7}"/>
+                  </a:ext>
+                </a:extLst>
+              </p:cNvPr>
+              <p:cNvSpPr/>
+              <p:nvPr/>
+            </p:nvSpPr>
+            <p:spPr>
+              <a:xfrm>
+                <a:off x="635000" y="4800600"/>
+                <a:ext cx="1155700" cy="1155700"/>
+              </a:xfrm>
+              <a:prstGeom prst="rect">
+                <a:avLst/>
+              </a:prstGeom>
+              <a:grpFill/>
+            </p:spPr>
+            <p:style>
+              <a:lnRef idx="2">
+                <a:schemeClr val="accent4">
+                  <a:shade val="15000"/>
+                </a:schemeClr>
+              </a:lnRef>
+              <a:fillRef idx="1">
+                <a:schemeClr val="accent4"/>
+              </a:fillRef>
+              <a:effectRef idx="0">
+                <a:schemeClr val="accent4"/>
+              </a:effectRef>
+              <a:fontRef idx="minor">
+                <a:schemeClr val="lt1"/>
+              </a:fontRef>
+            </p:style>
+            <p:txBody>
+              <a:bodyPr rtlCol="0" anchor="ctr"/>
+              <a:lstStyle/>
+              <a:p>
+                <a:pPr algn="ctr"/>
+                <a:endParaRPr lang="en-US" dirty="0"/>
+              </a:p>
+            </p:txBody>
+          </p:sp>
+          <p:sp>
+            <p:nvSpPr>
+              <p:cNvPr id="31" name="Rectangle 30">
+                <a:extLst>
+                  <a:ext uri="{FF2B5EF4-FFF2-40B4-BE49-F238E27FC236}">
+                    <a16:creationId xmlns:a16="http://schemas.microsoft.com/office/drawing/2014/main" id="{945173E7-B904-7A2D-AD4C-CC8AE0D011EA}"/>
+                  </a:ext>
+                </a:extLst>
+              </p:cNvPr>
+              <p:cNvSpPr/>
+              <p:nvPr/>
+            </p:nvSpPr>
+            <p:spPr>
+              <a:xfrm>
+                <a:off x="527050" y="4908550"/>
+                <a:ext cx="1155700" cy="1155700"/>
+              </a:xfrm>
+              <a:prstGeom prst="rect">
+                <a:avLst/>
+              </a:prstGeom>
+              <a:grpFill/>
+            </p:spPr>
+            <p:style>
+              <a:lnRef idx="2">
+                <a:schemeClr val="accent4">
+                  <a:shade val="15000"/>
+                </a:schemeClr>
+              </a:lnRef>
+              <a:fillRef idx="1">
+                <a:schemeClr val="accent4"/>
+              </a:fillRef>
+              <a:effectRef idx="0">
+                <a:schemeClr val="accent4"/>
+              </a:effectRef>
+              <a:fontRef idx="minor">
+                <a:schemeClr val="lt1"/>
+              </a:fontRef>
+            </p:style>
+            <p:txBody>
+              <a:bodyPr rtlCol="0" anchor="ctr"/>
+              <a:lstStyle/>
+              <a:p>
+                <a:pPr algn="ctr"/>
+                <a:endParaRPr lang="en-US" dirty="0">
+                  <a:highlight>
+                    <a:srgbClr val="000000"/>
+                  </a:highlight>
+                </a:endParaRPr>
+              </a:p>
+            </p:txBody>
+          </p:sp>
+        </p:grpSp>
+      </p:grpSp>
+      <p:sp>
+        <p:nvSpPr>
+          <p:cNvPr id="34" name="Right Arrow 33">
+            <a:extLst>
+              <a:ext uri="{FF2B5EF4-FFF2-40B4-BE49-F238E27FC236}">
+                <a16:creationId xmlns:a16="http://schemas.microsoft.com/office/drawing/2014/main" id="{C8AC6CB9-E382-C919-C0A8-E057C1B90405}"/>
+              </a:ext>
+            </a:extLst>
+          </p:cNvPr>
+          <p:cNvSpPr/>
+          <p:nvPr/>
+        </p:nvSpPr>
+        <p:spPr>
+          <a:xfrm>
+            <a:off x="5517356" y="5390929"/>
+            <a:ext cx="763588" cy="422720"/>
+          </a:xfrm>
+          <a:prstGeom prst="rightArrow">
+            <a:avLst/>
+          </a:prstGeom>
+          <a:solidFill>
+            <a:schemeClr val="bg2">
+              <a:lumMod val="50000"/>
+            </a:schemeClr>
+          </a:solidFill>
+          <a:ln>
+            <a:noFill/>
+          </a:ln>
+        </p:spPr>
+        <p:style>
+          <a:lnRef idx="2">
+            <a:schemeClr val="accent1">
+              <a:shade val="15000"/>
+            </a:schemeClr>
+          </a:lnRef>
+          <a:fillRef idx="1">
+            <a:schemeClr val="accent1"/>
+          </a:fillRef>
+          <a:effectRef idx="0">
+            <a:schemeClr val="accent1"/>
+          </a:effectRef>
+          <a:fontRef idx="minor">
+            <a:schemeClr val="lt1"/>
+          </a:fontRef>
+        </p:style>
+        <p:txBody>
+          <a:bodyPr rtlCol="0" anchor="ctr"/>
+          <a:lstStyle/>
+          <a:p>
+            <a:pPr algn="ctr"/>
+            <a:endParaRPr lang="en-US"/>
+          </a:p>
+        </p:txBody>
+      </p:sp>
+      <p:sp>
+        <p:nvSpPr>
+          <p:cNvPr id="35" name="Down Arrow 34">
+            <a:extLst>
+              <a:ext uri="{FF2B5EF4-FFF2-40B4-BE49-F238E27FC236}">
+                <a16:creationId xmlns:a16="http://schemas.microsoft.com/office/drawing/2014/main" id="{215AAE00-8562-B8F1-BE88-09C82279CD67}"/>
+              </a:ext>
+            </a:extLst>
+          </p:cNvPr>
+          <p:cNvSpPr/>
+          <p:nvPr/>
+        </p:nvSpPr>
+        <p:spPr>
+          <a:xfrm>
+            <a:off x="4518984" y="2086542"/>
+            <a:ext cx="209385" cy="422720"/>
+          </a:xfrm>
+          <a:prstGeom prst="downArrow">
+            <a:avLst/>
+          </a:prstGeom>
+          <a:solidFill>
+            <a:schemeClr val="bg2">
+              <a:lumMod val="50000"/>
+            </a:schemeClr>
+          </a:solidFill>
+          <a:ln>
+            <a:noFill/>
+          </a:ln>
+        </p:spPr>
+        <p:style>
+          <a:lnRef idx="2">
+            <a:schemeClr val="accent1">
+              <a:shade val="15000"/>
+            </a:schemeClr>
+          </a:lnRef>
+          <a:fillRef idx="1">
+            <a:schemeClr val="accent1"/>
+          </a:fillRef>
+          <a:effectRef idx="0">
+            <a:schemeClr val="accent1"/>
+          </a:effectRef>
+          <a:fontRef idx="minor">
+            <a:schemeClr val="lt1"/>
+          </a:fontRef>
+        </p:style>
+        <p:txBody>
+          <a:bodyPr rtlCol="0" anchor="ctr"/>
+          <a:lstStyle/>
+          <a:p>
+            <a:pPr algn="ctr"/>
+            <a:endParaRPr lang="en-US"/>
+          </a:p>
+        </p:txBody>
+      </p:sp>
+      <p:sp>
+        <p:nvSpPr>
+          <p:cNvPr id="36" name="Down Arrow 35">
+            <a:extLst>
+              <a:ext uri="{FF2B5EF4-FFF2-40B4-BE49-F238E27FC236}">
+                <a16:creationId xmlns:a16="http://schemas.microsoft.com/office/drawing/2014/main" id="{C67580A5-E079-1F77-249D-1539D6F3B528}"/>
+              </a:ext>
+            </a:extLst>
+          </p:cNvPr>
+          <p:cNvSpPr/>
+          <p:nvPr/>
+        </p:nvSpPr>
+        <p:spPr>
+          <a:xfrm>
+            <a:off x="2097090" y="2086542"/>
+            <a:ext cx="209385" cy="422720"/>
+          </a:xfrm>
+          <a:prstGeom prst="downArrow">
+            <a:avLst/>
+          </a:prstGeom>
+          <a:solidFill>
+            <a:schemeClr val="bg2">
+              <a:lumMod val="50000"/>
+            </a:schemeClr>
+          </a:solidFill>
+          <a:ln>
+            <a:noFill/>
+          </a:ln>
+        </p:spPr>
+        <p:style>
+          <a:lnRef idx="2">
+            <a:schemeClr val="accent1">
+              <a:shade val="15000"/>
+            </a:schemeClr>
+          </a:lnRef>
+          <a:fillRef idx="1">
+            <a:schemeClr val="accent1"/>
+          </a:fillRef>
+          <a:effectRef idx="0">
+            <a:schemeClr val="accent1"/>
+          </a:effectRef>
+          <a:fontRef idx="minor">
+            <a:schemeClr val="lt1"/>
+          </a:fontRef>
+        </p:style>
+        <p:txBody>
+          <a:bodyPr rtlCol="0" anchor="ctr"/>
+          <a:lstStyle/>
+          <a:p>
+            <a:pPr algn="ctr"/>
+            <a:endParaRPr lang="en-US"/>
+          </a:p>
+        </p:txBody>
+      </p:sp>
+      <p:sp>
+        <p:nvSpPr>
+          <p:cNvPr id="37" name="Down Arrow 36">
+            <a:extLst>
+              <a:ext uri="{FF2B5EF4-FFF2-40B4-BE49-F238E27FC236}">
+                <a16:creationId xmlns:a16="http://schemas.microsoft.com/office/drawing/2014/main" id="{C1D1FF4F-9580-B64E-DB32-1D1355C39888}"/>
+              </a:ext>
+            </a:extLst>
+          </p:cNvPr>
+          <p:cNvSpPr/>
+          <p:nvPr/>
+        </p:nvSpPr>
+        <p:spPr>
+          <a:xfrm>
+            <a:off x="2097090" y="4253877"/>
+            <a:ext cx="209385" cy="422720"/>
+          </a:xfrm>
+          <a:prstGeom prst="downArrow">
+            <a:avLst/>
+          </a:prstGeom>
+          <a:solidFill>
+            <a:schemeClr val="bg2">
+              <a:lumMod val="50000"/>
+            </a:schemeClr>
+          </a:solidFill>
+          <a:ln>
+            <a:noFill/>
+          </a:ln>
+        </p:spPr>
+        <p:style>
+          <a:lnRef idx="2">
+            <a:schemeClr val="accent1">
+              <a:shade val="15000"/>
+            </a:schemeClr>
+          </a:lnRef>
+          <a:fillRef idx="1">
+            <a:schemeClr val="accent1"/>
+          </a:fillRef>
+          <a:effectRef idx="0">
+            <a:schemeClr val="accent1"/>
+          </a:effectRef>
+          <a:fontRef idx="minor">
+            <a:schemeClr val="lt1"/>
+          </a:fontRef>
+        </p:style>
+        <p:txBody>
+          <a:bodyPr rtlCol="0" anchor="ctr"/>
+          <a:lstStyle/>
+          <a:p>
+            <a:pPr algn="ctr"/>
+            <a:endParaRPr lang="en-US"/>
+          </a:p>
+        </p:txBody>
+      </p:sp>
+      <p:sp>
+        <p:nvSpPr>
+          <p:cNvPr id="38" name="Down Arrow 37">
+            <a:extLst>
+              <a:ext uri="{FF2B5EF4-FFF2-40B4-BE49-F238E27FC236}">
+                <a16:creationId xmlns:a16="http://schemas.microsoft.com/office/drawing/2014/main" id="{B8E1DFE6-4F0B-4BDE-09AD-C2E35DB743F2}"/>
+              </a:ext>
+            </a:extLst>
+          </p:cNvPr>
+          <p:cNvSpPr/>
+          <p:nvPr/>
+        </p:nvSpPr>
+        <p:spPr>
+          <a:xfrm>
+            <a:off x="4518984" y="4249290"/>
+            <a:ext cx="209385" cy="422720"/>
+          </a:xfrm>
+          <a:prstGeom prst="downArrow">
+            <a:avLst/>
+          </a:prstGeom>
+          <a:solidFill>
+            <a:schemeClr val="bg2">
+              <a:lumMod val="50000"/>
+            </a:schemeClr>
+          </a:solidFill>
+          <a:ln>
+            <a:noFill/>
+          </a:ln>
+        </p:spPr>
+        <p:style>
+          <a:lnRef idx="2">
+            <a:schemeClr val="accent1">
+              <a:shade val="15000"/>
+            </a:schemeClr>
+          </a:lnRef>
+          <a:fillRef idx="1">
+            <a:schemeClr val="accent1"/>
+          </a:fillRef>
+          <a:effectRef idx="0">
+            <a:schemeClr val="accent1"/>
+          </a:effectRef>
+          <a:fontRef idx="minor">
+            <a:schemeClr val="lt1"/>
+          </a:fontRef>
+        </p:style>
+        <p:txBody>
+          <a:bodyPr rtlCol="0" anchor="ctr"/>
+          <a:lstStyle/>
+          <a:p>
+            <a:pPr algn="ctr"/>
+            <a:endParaRPr lang="en-US"/>
+          </a:p>
+        </p:txBody>
+      </p:sp>
+      <p:sp>
+        <p:nvSpPr>
+          <p:cNvPr id="39" name="TextBox 38">
+            <a:extLst>
+              <a:ext uri="{FF2B5EF4-FFF2-40B4-BE49-F238E27FC236}">
+                <a16:creationId xmlns:a16="http://schemas.microsoft.com/office/drawing/2014/main" id="{6195FCB7-B7AF-4849-915A-1713758516B6}"/>
+              </a:ext>
+            </a:extLst>
+          </p:cNvPr>
+          <p:cNvSpPr txBox="1"/>
+          <p:nvPr/>
+        </p:nvSpPr>
+        <p:spPr>
+          <a:xfrm>
+            <a:off x="2653664" y="1754181"/>
+            <a:ext cx="1534637" cy="830997"/>
+          </a:xfrm>
+          <a:prstGeom prst="rect">
+            <a:avLst/>
+          </a:prstGeom>
+          <a:noFill/>
+        </p:spPr>
+        <p:txBody>
+          <a:bodyPr wrap="square" rtlCol="0">
+            <a:spAutoFit/>
+          </a:bodyPr>
+          <a:lstStyle/>
+          <a:p>
+            <a:pPr algn="ctr"/>
+            <a:r>
+              <a:rPr lang="en-US" sz="1200" dirty="0"/>
+              <a:t>produce output from the CFD solver and mass-conserving solver </a:t>
+            </a:r>
+          </a:p>
+        </p:txBody>
+      </p:sp>
+      <p:sp>
+        <p:nvSpPr>
+          <p:cNvPr id="40" name="TextBox 39">
+            <a:extLst>
+              <a:ext uri="{FF2B5EF4-FFF2-40B4-BE49-F238E27FC236}">
+                <a16:creationId xmlns:a16="http://schemas.microsoft.com/office/drawing/2014/main" id="{40FE9E2F-924C-E618-0A0C-A07CA4BF0B45}"/>
+              </a:ext>
+            </a:extLst>
+          </p:cNvPr>
+          <p:cNvSpPr txBox="1"/>
+          <p:nvPr/>
+        </p:nvSpPr>
+        <p:spPr>
+          <a:xfrm>
+            <a:off x="2663663" y="4178421"/>
+            <a:ext cx="1336838" cy="646331"/>
+          </a:xfrm>
+          <a:prstGeom prst="rect">
+            <a:avLst/>
+          </a:prstGeom>
+          <a:noFill/>
+        </p:spPr>
+        <p:txBody>
+          <a:bodyPr wrap="square" rtlCol="0">
+            <a:spAutoFit/>
+          </a:bodyPr>
+          <a:lstStyle/>
+          <a:p>
+            <a:pPr algn="ctr"/>
+            <a:r>
+              <a:rPr lang="en-US" sz="1200" dirty="0"/>
+              <a:t>Reduce grid dimensions to 128 x 128</a:t>
+            </a:r>
+          </a:p>
+        </p:txBody>
+      </p:sp>
+      <p:sp>
+        <p:nvSpPr>
+          <p:cNvPr id="41" name="TextBox 40">
+            <a:extLst>
+              <a:ext uri="{FF2B5EF4-FFF2-40B4-BE49-F238E27FC236}">
+                <a16:creationId xmlns:a16="http://schemas.microsoft.com/office/drawing/2014/main" id="{DE7A24C9-8F27-C36E-D3C3-B7C1975CE410}"/>
+              </a:ext>
+            </a:extLst>
+          </p:cNvPr>
+          <p:cNvSpPr txBox="1"/>
+          <p:nvPr/>
+        </p:nvSpPr>
+        <p:spPr>
+          <a:xfrm>
+            <a:off x="2293139" y="6151218"/>
+            <a:ext cx="2022402" cy="646331"/>
+          </a:xfrm>
+          <a:prstGeom prst="rect">
+            <a:avLst/>
+          </a:prstGeom>
+          <a:noFill/>
+        </p:spPr>
+        <p:txBody>
+          <a:bodyPr wrap="square" rtlCol="0">
+            <a:spAutoFit/>
+          </a:bodyPr>
+          <a:lstStyle/>
+          <a:p>
+            <a:pPr algn="ctr"/>
+            <a:r>
+              <a:rPr lang="en-US" sz="1200" dirty="0"/>
+              <a:t>Subtract mass-conserving solver output from CFD solver output</a:t>
+            </a:r>
+          </a:p>
+        </p:txBody>
+      </p:sp>
+      <p:sp>
+        <p:nvSpPr>
+          <p:cNvPr id="42" name="TextBox 41">
+            <a:extLst>
+              <a:ext uri="{FF2B5EF4-FFF2-40B4-BE49-F238E27FC236}">
+                <a16:creationId xmlns:a16="http://schemas.microsoft.com/office/drawing/2014/main" id="{3C8599F2-2CA1-4594-8FD9-5EA1C3235E0B}"/>
+              </a:ext>
+            </a:extLst>
+          </p:cNvPr>
+          <p:cNvSpPr txBox="1"/>
+          <p:nvPr/>
+        </p:nvSpPr>
+        <p:spPr>
+          <a:xfrm>
+            <a:off x="6758405" y="6188289"/>
+            <a:ext cx="1045332" cy="276999"/>
+          </a:xfrm>
+          <a:prstGeom prst="rect">
+            <a:avLst/>
+          </a:prstGeom>
+          <a:noFill/>
+        </p:spPr>
+        <p:txBody>
+          <a:bodyPr wrap="square" rtlCol="0">
+            <a:spAutoFit/>
+          </a:bodyPr>
+          <a:lstStyle/>
+          <a:p>
+            <a:pPr algn="ctr"/>
+            <a:r>
+              <a:rPr lang="en-US" sz="1200" dirty="0"/>
+              <a:t>target</a:t>
+            </a:r>
+          </a:p>
+        </p:txBody>
+      </p:sp>
+      <p:sp>
+        <p:nvSpPr>
+          <p:cNvPr id="43" name="TextBox 42">
+            <a:extLst>
+              <a:ext uri="{FF2B5EF4-FFF2-40B4-BE49-F238E27FC236}">
+                <a16:creationId xmlns:a16="http://schemas.microsoft.com/office/drawing/2014/main" id="{DAC500C9-BB4F-0D48-EC87-8330A34E8D88}"/>
+              </a:ext>
+            </a:extLst>
+          </p:cNvPr>
+          <p:cNvSpPr txBox="1"/>
+          <p:nvPr/>
+        </p:nvSpPr>
+        <p:spPr>
+          <a:xfrm>
+            <a:off x="6982582" y="4025633"/>
+            <a:ext cx="658371" cy="461665"/>
+          </a:xfrm>
+          <a:prstGeom prst="rect">
+            <a:avLst/>
+          </a:prstGeom>
+          <a:noFill/>
+        </p:spPr>
+        <p:txBody>
+          <a:bodyPr wrap="square" rtlCol="0">
+            <a:spAutoFit/>
+          </a:bodyPr>
+          <a:lstStyle/>
+          <a:p>
+            <a:pPr algn="ctr"/>
+            <a:r>
+              <a:rPr lang="en-US" sz="1200" dirty="0"/>
+              <a:t>Build input</a:t>
+            </a:r>
+          </a:p>
+        </p:txBody>
+      </p:sp>
+      <p:sp>
+        <p:nvSpPr>
+          <p:cNvPr id="44" name="Down Arrow 43">
+            <a:extLst>
+              <a:ext uri="{FF2B5EF4-FFF2-40B4-BE49-F238E27FC236}">
+                <a16:creationId xmlns:a16="http://schemas.microsoft.com/office/drawing/2014/main" id="{FAE53681-1456-6088-3C0A-A62398776DF8}"/>
+              </a:ext>
+            </a:extLst>
+          </p:cNvPr>
+          <p:cNvSpPr/>
+          <p:nvPr/>
+        </p:nvSpPr>
+        <p:spPr>
+          <a:xfrm rot="16200000">
+            <a:off x="8684182" y="604475"/>
+            <a:ext cx="209385" cy="422720"/>
+          </a:xfrm>
+          <a:prstGeom prst="downArrow">
+            <a:avLst/>
+          </a:prstGeom>
+          <a:solidFill>
+            <a:schemeClr val="bg2">
+              <a:lumMod val="50000"/>
+            </a:schemeClr>
+          </a:solidFill>
+          <a:ln>
+            <a:noFill/>
+          </a:ln>
+        </p:spPr>
+        <p:style>
+          <a:lnRef idx="2">
+            <a:schemeClr val="accent1">
+              <a:shade val="15000"/>
+            </a:schemeClr>
+          </a:lnRef>
+          <a:fillRef idx="1">
+            <a:schemeClr val="accent1"/>
+          </a:fillRef>
+          <a:effectRef idx="0">
+            <a:schemeClr val="accent1"/>
+          </a:effectRef>
+          <a:fontRef idx="minor">
+            <a:schemeClr val="lt1"/>
+          </a:fontRef>
+        </p:style>
+        <p:txBody>
+          <a:bodyPr rtlCol="0" anchor="ctr"/>
+          <a:lstStyle/>
+          <a:p>
+            <a:pPr algn="ctr"/>
+            <a:endParaRPr lang="en-US"/>
+          </a:p>
+        </p:txBody>
+      </p:sp>
+      <p:sp>
+        <p:nvSpPr>
+          <p:cNvPr id="45" name="TextBox 44">
+            <a:extLst>
+              <a:ext uri="{FF2B5EF4-FFF2-40B4-BE49-F238E27FC236}">
+                <a16:creationId xmlns:a16="http://schemas.microsoft.com/office/drawing/2014/main" id="{2853A60D-C5A1-3D9D-1D9B-5ADC95D109DF}"/>
+              </a:ext>
+            </a:extLst>
+          </p:cNvPr>
+          <p:cNvSpPr txBox="1"/>
+          <p:nvPr/>
+        </p:nvSpPr>
+        <p:spPr>
+          <a:xfrm>
+            <a:off x="6952398" y="1397704"/>
+            <a:ext cx="1045332" cy="461665"/>
+          </a:xfrm>
+          <a:prstGeom prst="rect">
+            <a:avLst/>
+          </a:prstGeom>
+          <a:noFill/>
+        </p:spPr>
+        <p:txBody>
+          <a:bodyPr wrap="square" rtlCol="0">
+            <a:spAutoFit/>
+          </a:bodyPr>
+          <a:lstStyle/>
+          <a:p>
+            <a:pPr algn="ctr"/>
+            <a:r>
+              <a:rPr lang="en-US" sz="1200" dirty="0"/>
+              <a:t>Elevation grid</a:t>
+            </a:r>
+          </a:p>
+        </p:txBody>
+      </p:sp>
+      <p:sp>
+        <p:nvSpPr>
+          <p:cNvPr id="46" name="TextBox 45">
+            <a:extLst>
+              <a:ext uri="{FF2B5EF4-FFF2-40B4-BE49-F238E27FC236}">
+                <a16:creationId xmlns:a16="http://schemas.microsoft.com/office/drawing/2014/main" id="{A4F251CE-2A3E-114D-D2EB-7429E6618369}"/>
+              </a:ext>
+            </a:extLst>
+          </p:cNvPr>
+          <p:cNvSpPr txBox="1"/>
+          <p:nvPr/>
+        </p:nvSpPr>
+        <p:spPr>
+          <a:xfrm>
+            <a:off x="8125239" y="1353466"/>
+            <a:ext cx="1327270" cy="646331"/>
+          </a:xfrm>
+          <a:prstGeom prst="rect">
+            <a:avLst/>
+          </a:prstGeom>
+          <a:noFill/>
+        </p:spPr>
+        <p:txBody>
+          <a:bodyPr wrap="square" rtlCol="0">
+            <a:spAutoFit/>
+          </a:bodyPr>
+          <a:lstStyle/>
+          <a:p>
+            <a:pPr algn="ctr"/>
+            <a:r>
+              <a:rPr lang="en-US" sz="1200" dirty="0"/>
+              <a:t>Reduce </a:t>
+            </a:r>
+            <a:r>
+              <a:rPr lang="en-US" sz="1200"/>
+              <a:t>grid dimensions </a:t>
+            </a:r>
+            <a:r>
+              <a:rPr lang="en-US" sz="1200" dirty="0"/>
+              <a:t>to 128 x 128</a:t>
+            </a:r>
+          </a:p>
+        </p:txBody>
+      </p:sp>
+      <p:sp>
+        <p:nvSpPr>
+          <p:cNvPr id="47" name="Right Arrow 46">
+            <a:extLst>
+              <a:ext uri="{FF2B5EF4-FFF2-40B4-BE49-F238E27FC236}">
+                <a16:creationId xmlns:a16="http://schemas.microsoft.com/office/drawing/2014/main" id="{D4F3361F-4F63-7A0C-0044-9C8E46CC73C6}"/>
+              </a:ext>
+            </a:extLst>
+          </p:cNvPr>
+          <p:cNvSpPr/>
+          <p:nvPr/>
+        </p:nvSpPr>
+        <p:spPr>
+          <a:xfrm rot="1559059">
+            <a:off x="8200045" y="3444895"/>
+            <a:ext cx="754938" cy="193657"/>
+          </a:xfrm>
+          <a:prstGeom prst="rightArrow">
+            <a:avLst/>
+          </a:prstGeom>
+          <a:solidFill>
+            <a:schemeClr val="bg2">
+              <a:lumMod val="50000"/>
+            </a:schemeClr>
+          </a:solidFill>
+          <a:ln>
+            <a:noFill/>
+          </a:ln>
+        </p:spPr>
+        <p:style>
+          <a:lnRef idx="2">
+            <a:schemeClr val="accent1">
+              <a:shade val="15000"/>
+            </a:schemeClr>
+          </a:lnRef>
+          <a:fillRef idx="1">
+            <a:schemeClr val="accent1"/>
+          </a:fillRef>
+          <a:effectRef idx="0">
+            <a:schemeClr val="accent1"/>
+          </a:effectRef>
+          <a:fontRef idx="minor">
+            <a:schemeClr val="lt1"/>
+          </a:fontRef>
+        </p:style>
+        <p:txBody>
+          <a:bodyPr rtlCol="0" anchor="ctr"/>
+          <a:lstStyle/>
+          <a:p>
+            <a:pPr algn="ctr"/>
+            <a:endParaRPr lang="en-US"/>
+          </a:p>
+        </p:txBody>
+      </p:sp>
+      <p:sp>
+        <p:nvSpPr>
+          <p:cNvPr id="48" name="Right Arrow 47">
+            <a:extLst>
+              <a:ext uri="{FF2B5EF4-FFF2-40B4-BE49-F238E27FC236}">
+                <a16:creationId xmlns:a16="http://schemas.microsoft.com/office/drawing/2014/main" id="{2154A70B-1DA4-FD43-61E7-F4B1BA4444C7}"/>
+              </a:ext>
+            </a:extLst>
+          </p:cNvPr>
+          <p:cNvSpPr/>
+          <p:nvPr/>
+        </p:nvSpPr>
+        <p:spPr>
+          <a:xfrm rot="19989047">
+            <a:off x="8093868" y="5073581"/>
+            <a:ext cx="754938" cy="193657"/>
+          </a:xfrm>
+          <a:prstGeom prst="rightArrow">
+            <a:avLst/>
+          </a:prstGeom>
+          <a:solidFill>
+            <a:schemeClr val="bg2">
+              <a:lumMod val="50000"/>
+            </a:schemeClr>
+          </a:solidFill>
+          <a:ln>
+            <a:noFill/>
+          </a:ln>
+        </p:spPr>
+        <p:style>
+          <a:lnRef idx="2">
+            <a:schemeClr val="accent1">
+              <a:shade val="15000"/>
+            </a:schemeClr>
+          </a:lnRef>
+          <a:fillRef idx="1">
+            <a:schemeClr val="accent1"/>
+          </a:fillRef>
+          <a:effectRef idx="0">
+            <a:schemeClr val="accent1"/>
+          </a:effectRef>
+          <a:fontRef idx="minor">
+            <a:schemeClr val="lt1"/>
+          </a:fontRef>
+        </p:style>
+        <p:txBody>
+          <a:bodyPr rtlCol="0" anchor="ctr"/>
+          <a:lstStyle/>
+          <a:p>
+            <a:pPr algn="ctr"/>
+            <a:endParaRPr lang="en-US"/>
+          </a:p>
+        </p:txBody>
+      </p:sp>
+      <p:sp>
+        <p:nvSpPr>
+          <p:cNvPr id="50" name="Oval 49">
+            <a:extLst>
+              <a:ext uri="{FF2B5EF4-FFF2-40B4-BE49-F238E27FC236}">
+                <a16:creationId xmlns:a16="http://schemas.microsoft.com/office/drawing/2014/main" id="{8D71C776-C439-BD9B-1A0E-0F133D6D51D5}"/>
+              </a:ext>
+            </a:extLst>
+          </p:cNvPr>
+          <p:cNvSpPr/>
+          <p:nvPr/>
+        </p:nvSpPr>
+        <p:spPr>
+          <a:xfrm>
+            <a:off x="3288105" y="1474719"/>
+            <a:ext cx="285750" cy="285750"/>
+          </a:xfrm>
+          <a:prstGeom prst="ellipse">
+            <a:avLst/>
+          </a:prstGeom>
+          <a:noFill/>
+        </p:spPr>
+        <p:style>
+          <a:lnRef idx="2">
+            <a:schemeClr val="accent1">
+              <a:shade val="15000"/>
+            </a:schemeClr>
+          </a:lnRef>
+          <a:fillRef idx="1">
+            <a:schemeClr val="accent1"/>
+          </a:fillRef>
+          <a:effectRef idx="0">
+            <a:schemeClr val="accent1"/>
+          </a:effectRef>
+          <a:fontRef idx="minor">
+            <a:schemeClr val="lt1"/>
+          </a:fontRef>
+        </p:style>
+        <p:txBody>
+          <a:bodyPr rtlCol="0" anchor="ctr"/>
+          <a:lstStyle/>
+          <a:p>
+            <a:pPr algn="ctr"/>
+            <a:r>
+              <a:rPr lang="en-US" dirty="0">
+                <a:solidFill>
+                  <a:srgbClr val="002060"/>
+                </a:solidFill>
+              </a:rPr>
+              <a:t>1</a:t>
+            </a:r>
+          </a:p>
+        </p:txBody>
+      </p:sp>
+      <p:sp>
+        <p:nvSpPr>
+          <p:cNvPr id="51" name="Oval 50">
+            <a:extLst>
+              <a:ext uri="{FF2B5EF4-FFF2-40B4-BE49-F238E27FC236}">
+                <a16:creationId xmlns:a16="http://schemas.microsoft.com/office/drawing/2014/main" id="{1A553EAA-E64D-EA45-AA2E-52536C5A21C5}"/>
+              </a:ext>
+            </a:extLst>
+          </p:cNvPr>
+          <p:cNvSpPr/>
+          <p:nvPr/>
+        </p:nvSpPr>
+        <p:spPr>
+          <a:xfrm>
+            <a:off x="3263504" y="3914584"/>
+            <a:ext cx="285750" cy="285750"/>
+          </a:xfrm>
+          <a:prstGeom prst="ellipse">
+            <a:avLst/>
+          </a:prstGeom>
+          <a:noFill/>
+        </p:spPr>
+        <p:style>
+          <a:lnRef idx="2">
+            <a:schemeClr val="accent1">
+              <a:shade val="15000"/>
+            </a:schemeClr>
+          </a:lnRef>
+          <a:fillRef idx="1">
+            <a:schemeClr val="accent1"/>
+          </a:fillRef>
+          <a:effectRef idx="0">
+            <a:schemeClr val="accent1"/>
+          </a:effectRef>
+          <a:fontRef idx="minor">
+            <a:schemeClr val="lt1"/>
+          </a:fontRef>
+        </p:style>
+        <p:txBody>
+          <a:bodyPr rtlCol="0" anchor="ctr"/>
+          <a:lstStyle/>
+          <a:p>
+            <a:pPr algn="ctr"/>
+            <a:r>
+              <a:rPr lang="en-US" dirty="0">
+                <a:solidFill>
+                  <a:srgbClr val="002060"/>
+                </a:solidFill>
+              </a:rPr>
+              <a:t>2</a:t>
+            </a:r>
+          </a:p>
+        </p:txBody>
+      </p:sp>
+      <p:sp>
+        <p:nvSpPr>
+          <p:cNvPr id="52" name="Oval 51">
+            <a:extLst>
+              <a:ext uri="{FF2B5EF4-FFF2-40B4-BE49-F238E27FC236}">
+                <a16:creationId xmlns:a16="http://schemas.microsoft.com/office/drawing/2014/main" id="{0A01D7D7-F941-D4EE-1AE9-1E3444570AC2}"/>
+              </a:ext>
+            </a:extLst>
+          </p:cNvPr>
+          <p:cNvSpPr/>
+          <p:nvPr/>
+        </p:nvSpPr>
+        <p:spPr>
+          <a:xfrm>
+            <a:off x="8673500" y="1080631"/>
+            <a:ext cx="285750" cy="285750"/>
+          </a:xfrm>
+          <a:prstGeom prst="ellipse">
+            <a:avLst/>
+          </a:prstGeom>
+          <a:noFill/>
+        </p:spPr>
+        <p:style>
+          <a:lnRef idx="2">
+            <a:schemeClr val="accent1">
+              <a:shade val="15000"/>
+            </a:schemeClr>
+          </a:lnRef>
+          <a:fillRef idx="1">
+            <a:schemeClr val="accent1"/>
+          </a:fillRef>
+          <a:effectRef idx="0">
+            <a:schemeClr val="accent1"/>
+          </a:effectRef>
+          <a:fontRef idx="minor">
+            <a:schemeClr val="lt1"/>
+          </a:fontRef>
+        </p:style>
+        <p:txBody>
+          <a:bodyPr rtlCol="0" anchor="ctr"/>
+          <a:lstStyle/>
+          <a:p>
+            <a:pPr algn="ctr"/>
+            <a:r>
+              <a:rPr lang="en-US" dirty="0">
+                <a:solidFill>
+                  <a:srgbClr val="002060"/>
+                </a:solidFill>
+              </a:rPr>
+              <a:t>2</a:t>
+            </a:r>
+          </a:p>
+        </p:txBody>
+      </p:sp>
+      <p:sp>
+        <p:nvSpPr>
+          <p:cNvPr id="53" name="Oval 52">
+            <a:extLst>
+              <a:ext uri="{FF2B5EF4-FFF2-40B4-BE49-F238E27FC236}">
+                <a16:creationId xmlns:a16="http://schemas.microsoft.com/office/drawing/2014/main" id="{C7C4F766-2477-305B-0824-921555AD808B}"/>
+              </a:ext>
+            </a:extLst>
+          </p:cNvPr>
+          <p:cNvSpPr/>
+          <p:nvPr/>
+        </p:nvSpPr>
+        <p:spPr>
+          <a:xfrm>
+            <a:off x="3145230" y="5905444"/>
+            <a:ext cx="285750" cy="285750"/>
+          </a:xfrm>
+          <a:prstGeom prst="ellipse">
+            <a:avLst/>
+          </a:prstGeom>
+          <a:noFill/>
+        </p:spPr>
+        <p:style>
+          <a:lnRef idx="2">
+            <a:schemeClr val="accent1">
+              <a:shade val="15000"/>
+            </a:schemeClr>
+          </a:lnRef>
+          <a:fillRef idx="1">
+            <a:schemeClr val="accent1"/>
+          </a:fillRef>
+          <a:effectRef idx="0">
+            <a:schemeClr val="accent1"/>
+          </a:effectRef>
+          <a:fontRef idx="minor">
+            <a:schemeClr val="lt1"/>
+          </a:fontRef>
+        </p:style>
+        <p:txBody>
+          <a:bodyPr rtlCol="0" anchor="ctr"/>
+          <a:lstStyle/>
+          <a:p>
+            <a:pPr algn="ctr"/>
+            <a:r>
+              <a:rPr lang="en-US" dirty="0">
+                <a:solidFill>
+                  <a:srgbClr val="002060"/>
+                </a:solidFill>
+              </a:rPr>
+              <a:t>3</a:t>
+            </a:r>
+          </a:p>
+        </p:txBody>
+      </p:sp>
+      <p:sp>
+        <p:nvSpPr>
+          <p:cNvPr id="54" name="Oval 53">
+            <a:extLst>
+              <a:ext uri="{FF2B5EF4-FFF2-40B4-BE49-F238E27FC236}">
+                <a16:creationId xmlns:a16="http://schemas.microsoft.com/office/drawing/2014/main" id="{CAB90EDA-37BF-27B8-D0AE-5AA477C50D42}"/>
+              </a:ext>
+            </a:extLst>
+          </p:cNvPr>
+          <p:cNvSpPr/>
+          <p:nvPr/>
+        </p:nvSpPr>
+        <p:spPr>
+          <a:xfrm>
+            <a:off x="6748607" y="4072542"/>
+            <a:ext cx="285750" cy="285750"/>
+          </a:xfrm>
+          <a:prstGeom prst="ellipse">
+            <a:avLst/>
+          </a:prstGeom>
+          <a:noFill/>
+        </p:spPr>
+        <p:style>
+          <a:lnRef idx="2">
+            <a:schemeClr val="accent1">
+              <a:shade val="15000"/>
+            </a:schemeClr>
+          </a:lnRef>
+          <a:fillRef idx="1">
+            <a:schemeClr val="accent1"/>
+          </a:fillRef>
+          <a:effectRef idx="0">
+            <a:schemeClr val="accent1"/>
+          </a:effectRef>
+          <a:fontRef idx="minor">
+            <a:schemeClr val="lt1"/>
+          </a:fontRef>
+        </p:style>
+        <p:txBody>
+          <a:bodyPr rtlCol="0" anchor="ctr"/>
+          <a:lstStyle/>
+          <a:p>
+            <a:pPr algn="ctr"/>
+            <a:r>
+              <a:rPr lang="en-US" dirty="0">
+                <a:solidFill>
+                  <a:srgbClr val="002060"/>
+                </a:solidFill>
+              </a:rPr>
+              <a:t>4</a:t>
+            </a:r>
+          </a:p>
+        </p:txBody>
+      </p:sp>
+      <p:sp>
+        <p:nvSpPr>
+          <p:cNvPr id="55" name="Oval 54">
+            <a:extLst>
+              <a:ext uri="{FF2B5EF4-FFF2-40B4-BE49-F238E27FC236}">
+                <a16:creationId xmlns:a16="http://schemas.microsoft.com/office/drawing/2014/main" id="{E253F27C-E252-C23B-A666-A1A510FD2933}"/>
+              </a:ext>
+            </a:extLst>
+          </p:cNvPr>
+          <p:cNvSpPr/>
+          <p:nvPr/>
+        </p:nvSpPr>
+        <p:spPr>
+          <a:xfrm>
+            <a:off x="8612728" y="4198170"/>
+            <a:ext cx="285750" cy="285750"/>
+          </a:xfrm>
+          <a:prstGeom prst="ellipse">
+            <a:avLst/>
+          </a:prstGeom>
+          <a:noFill/>
+        </p:spPr>
+        <p:style>
+          <a:lnRef idx="2">
+            <a:schemeClr val="accent1">
+              <a:shade val="15000"/>
+            </a:schemeClr>
+          </a:lnRef>
+          <a:fillRef idx="1">
+            <a:schemeClr val="accent1"/>
+          </a:fillRef>
+          <a:effectRef idx="0">
+            <a:schemeClr val="accent1"/>
+          </a:effectRef>
+          <a:fontRef idx="minor">
+            <a:schemeClr val="lt1"/>
+          </a:fontRef>
+        </p:style>
+        <p:txBody>
+          <a:bodyPr rtlCol="0" anchor="ctr"/>
+          <a:lstStyle/>
+          <a:p>
+            <a:pPr algn="ctr"/>
+            <a:r>
+              <a:rPr lang="en-US" dirty="0">
+                <a:solidFill>
+                  <a:srgbClr val="002060"/>
+                </a:solidFill>
+              </a:rPr>
+              <a:t>5</a:t>
+            </a:r>
+          </a:p>
+        </p:txBody>
+      </p:sp>
+      <p:cxnSp>
+        <p:nvCxnSpPr>
+          <p:cNvPr id="58" name="Straight Arrow Connector 57">
+            <a:extLst>
+              <a:ext uri="{FF2B5EF4-FFF2-40B4-BE49-F238E27FC236}">
+                <a16:creationId xmlns:a16="http://schemas.microsoft.com/office/drawing/2014/main" id="{C6C83442-5F3C-970E-36DB-990F431FF88B}"/>
+              </a:ext>
+            </a:extLst>
+          </p:cNvPr>
+          <p:cNvCxnSpPr>
+            <a:cxnSpLocks/>
+          </p:cNvCxnSpPr>
+          <p:nvPr/>
+        </p:nvCxnSpPr>
+        <p:spPr>
+          <a:xfrm flipV="1">
+            <a:off x="5410240" y="3921527"/>
+            <a:ext cx="1104392" cy="1029010"/>
+          </a:xfrm>
+          <a:prstGeom prst="straightConnector1">
+            <a:avLst/>
+          </a:prstGeom>
+          <a:ln>
+            <a:tailEnd type="triangle"/>
+          </a:ln>
+        </p:spPr>
+        <p:style>
+          <a:lnRef idx="2">
+            <a:schemeClr val="accent1"/>
+          </a:lnRef>
+          <a:fillRef idx="0">
+            <a:schemeClr val="accent1"/>
+          </a:fillRef>
+          <a:effectRef idx="1">
+            <a:schemeClr val="accent1"/>
+          </a:effectRef>
+          <a:fontRef idx="minor">
+            <a:schemeClr val="tx1"/>
+          </a:fontRef>
+        </p:style>
+      </p:cxnSp>
+      <p:cxnSp>
+        <p:nvCxnSpPr>
+          <p:cNvPr id="60" name="Straight Arrow Connector 59">
+            <a:extLst>
+              <a:ext uri="{FF2B5EF4-FFF2-40B4-BE49-F238E27FC236}">
+                <a16:creationId xmlns:a16="http://schemas.microsoft.com/office/drawing/2014/main" id="{15576210-C86D-012B-4482-142D47A3C093}"/>
+              </a:ext>
+            </a:extLst>
+          </p:cNvPr>
+          <p:cNvCxnSpPr/>
+          <p:nvPr/>
+        </p:nvCxnSpPr>
+        <p:spPr>
+          <a:xfrm flipH="1">
+            <a:off x="8322824" y="1739893"/>
+            <a:ext cx="1551702" cy="1002509"/>
+          </a:xfrm>
+          <a:prstGeom prst="straightConnector1">
+            <a:avLst/>
+          </a:prstGeom>
+          <a:ln>
+            <a:tailEnd type="triangle"/>
+          </a:ln>
+        </p:spPr>
+        <p:style>
+          <a:lnRef idx="2">
+            <a:schemeClr val="accent1"/>
+          </a:lnRef>
+          <a:fillRef idx="0">
+            <a:schemeClr val="accent1"/>
+          </a:fillRef>
+          <a:effectRef idx="1">
+            <a:schemeClr val="accent1"/>
+          </a:effectRef>
+          <a:fontRef idx="minor">
+            <a:schemeClr val="tx1"/>
+          </a:fontRef>
+        </p:style>
+      </p:cxnSp>
+      <p:sp>
+        <p:nvSpPr>
+          <p:cNvPr id="61" name="TextBox 60">
+            <a:extLst>
+              <a:ext uri="{FF2B5EF4-FFF2-40B4-BE49-F238E27FC236}">
+                <a16:creationId xmlns:a16="http://schemas.microsoft.com/office/drawing/2014/main" id="{323A6498-CB8D-ECDF-F4CB-97E17EC7A102}"/>
+              </a:ext>
+            </a:extLst>
+          </p:cNvPr>
+          <p:cNvSpPr txBox="1"/>
+          <p:nvPr/>
+        </p:nvSpPr>
+        <p:spPr>
+          <a:xfrm>
+            <a:off x="8435186" y="4479756"/>
+            <a:ext cx="658371" cy="276999"/>
+          </a:xfrm>
+          <a:prstGeom prst="rect">
+            <a:avLst/>
+          </a:prstGeom>
+          <a:noFill/>
+        </p:spPr>
+        <p:txBody>
+          <a:bodyPr wrap="square" rtlCol="0">
+            <a:spAutoFit/>
+          </a:bodyPr>
+          <a:lstStyle/>
+          <a:p>
+            <a:pPr algn="ctr"/>
+            <a:r>
+              <a:rPr lang="en-US" sz="1200" dirty="0"/>
+              <a:t>train</a:t>
+            </a:r>
+          </a:p>
+        </p:txBody>
+      </p:sp>
+    </p:spTree>
+    <p:extLst>
+      <p:ext uri="{BB962C8B-B14F-4D97-AF65-F5344CB8AC3E}">
+        <p14:creationId xmlns:p14="http://schemas.microsoft.com/office/powerpoint/2010/main" val="3133768404"/>
+      </p:ext>
+    </p:extLst>
+  </p:cSld>
+  <p:clrMapOvr>
+    <a:masterClrMapping/>
+  </p:clrMapOvr>
+</p:sld>
+</file>
+
 <file path=ppt/theme/theme1.xml><?xml version="1.0" encoding="utf-8"?>
 <a:theme xmlns:a="http://schemas.openxmlformats.org/drawingml/2006/main" name="Office Theme">
   <a:themeElements>

</xml_diff>

<commit_message>
adding instructions for use
</commit_message>
<xml_diff>
--- a/Thesis/U-NetDiagram.pptx
+++ b/Thesis/U-NetDiagram.pptx
@@ -260,7 +260,7 @@
           <a:p>
             <a:fld id="{D57B9C68-1D75-FD45-8BAC-B9DE3823D683}" type="datetimeFigureOut">
               <a:rPr lang="en-US" smtClean="0"/>
-              <a:t>3/28/25</a:t>
+              <a:t>4/9/25</a:t>
             </a:fld>
             <a:endParaRPr lang="en-US"/>
           </a:p>
@@ -458,7 +458,7 @@
           <a:p>
             <a:fld id="{D57B9C68-1D75-FD45-8BAC-B9DE3823D683}" type="datetimeFigureOut">
               <a:rPr lang="en-US" smtClean="0"/>
-              <a:t>3/28/25</a:t>
+              <a:t>4/9/25</a:t>
             </a:fld>
             <a:endParaRPr lang="en-US"/>
           </a:p>
@@ -666,7 +666,7 @@
           <a:p>
             <a:fld id="{D57B9C68-1D75-FD45-8BAC-B9DE3823D683}" type="datetimeFigureOut">
               <a:rPr lang="en-US" smtClean="0"/>
-              <a:t>3/28/25</a:t>
+              <a:t>4/9/25</a:t>
             </a:fld>
             <a:endParaRPr lang="en-US"/>
           </a:p>
@@ -864,7 +864,7 @@
           <a:p>
             <a:fld id="{D57B9C68-1D75-FD45-8BAC-B9DE3823D683}" type="datetimeFigureOut">
               <a:rPr lang="en-US" smtClean="0"/>
-              <a:t>3/28/25</a:t>
+              <a:t>4/9/25</a:t>
             </a:fld>
             <a:endParaRPr lang="en-US"/>
           </a:p>
@@ -1139,7 +1139,7 @@
           <a:p>
             <a:fld id="{D57B9C68-1D75-FD45-8BAC-B9DE3823D683}" type="datetimeFigureOut">
               <a:rPr lang="en-US" smtClean="0"/>
-              <a:t>3/28/25</a:t>
+              <a:t>4/9/25</a:t>
             </a:fld>
             <a:endParaRPr lang="en-US"/>
           </a:p>
@@ -1404,7 +1404,7 @@
           <a:p>
             <a:fld id="{D57B9C68-1D75-FD45-8BAC-B9DE3823D683}" type="datetimeFigureOut">
               <a:rPr lang="en-US" smtClean="0"/>
-              <a:t>3/28/25</a:t>
+              <a:t>4/9/25</a:t>
             </a:fld>
             <a:endParaRPr lang="en-US"/>
           </a:p>
@@ -1816,7 +1816,7 @@
           <a:p>
             <a:fld id="{D57B9C68-1D75-FD45-8BAC-B9DE3823D683}" type="datetimeFigureOut">
               <a:rPr lang="en-US" smtClean="0"/>
-              <a:t>3/28/25</a:t>
+              <a:t>4/9/25</a:t>
             </a:fld>
             <a:endParaRPr lang="en-US"/>
           </a:p>
@@ -1957,7 +1957,7 @@
           <a:p>
             <a:fld id="{D57B9C68-1D75-FD45-8BAC-B9DE3823D683}" type="datetimeFigureOut">
               <a:rPr lang="en-US" smtClean="0"/>
-              <a:t>3/28/25</a:t>
+              <a:t>4/9/25</a:t>
             </a:fld>
             <a:endParaRPr lang="en-US"/>
           </a:p>
@@ -2070,7 +2070,7 @@
           <a:p>
             <a:fld id="{D57B9C68-1D75-FD45-8BAC-B9DE3823D683}" type="datetimeFigureOut">
               <a:rPr lang="en-US" smtClean="0"/>
-              <a:t>3/28/25</a:t>
+              <a:t>4/9/25</a:t>
             </a:fld>
             <a:endParaRPr lang="en-US"/>
           </a:p>
@@ -2381,7 +2381,7 @@
           <a:p>
             <a:fld id="{D57B9C68-1D75-FD45-8BAC-B9DE3823D683}" type="datetimeFigureOut">
               <a:rPr lang="en-US" smtClean="0"/>
-              <a:t>3/28/25</a:t>
+              <a:t>4/9/25</a:t>
             </a:fld>
             <a:endParaRPr lang="en-US"/>
           </a:p>
@@ -2669,7 +2669,7 @@
           <a:p>
             <a:fld id="{D57B9C68-1D75-FD45-8BAC-B9DE3823D683}" type="datetimeFigureOut">
               <a:rPr lang="en-US" smtClean="0"/>
-              <a:t>3/28/25</a:t>
+              <a:t>4/9/25</a:t>
             </a:fld>
             <a:endParaRPr lang="en-US"/>
           </a:p>
@@ -2910,7 +2910,7 @@
           <a:p>
             <a:fld id="{D57B9C68-1D75-FD45-8BAC-B9DE3823D683}" type="datetimeFigureOut">
               <a:rPr lang="en-US" smtClean="0"/>
-              <a:t>3/28/25</a:t>
+              <a:t>4/9/25</a:t>
             </a:fld>
             <a:endParaRPr lang="en-US"/>
           </a:p>

</xml_diff>